<commit_message>
updated praxis slide deck & performed RCA using MPGE on Cats dataset
updated praxis slide deck & performed RCA using MPGE on Cats dataset
</commit_message>
<xml_diff>
--- a/praxis/Lowhorn_Jeremiah_HW#4_SEAS_8599_D2A.pptx
+++ b/praxis/Lowhorn_Jeremiah_HW#4_SEAS_8599_D2A.pptx
@@ -173,8 +173,8 @@
       <pc:docMk xmlns:pc="http://schemas.microsoft.com/office/powerpoint/2013/main/command"/>
       <pc:sldMk xmlns:pc="http://schemas.microsoft.com/office/powerpoint/2013/main/command" cId="1486523270" sldId="645"/>
       <ac:spMk id="2" creationId="{FBA18706-98C8-0331-2FD6-90AFF5252DD9}"/>
-      <ac:txMk cp="449" len="42">
-        <ac:context len="570" hash="1250878232"/>
+      <ac:txMk cp="450" len="42">
+        <ac:context len="571" hash="1268997302"/>
       </ac:txMk>
     </ac:txMkLst>
     <p188:pos x="7599800" y="1553091"/>
@@ -300,7 +300,7 @@
           <a:p>
             <a:fld id="{A6CF2B60-A650-A240-9969-3833CC7E6942}" type="datetimeFigureOut">
               <a:rPr lang="en-US" smtClean="0"/>
-              <a:t>10/21/2024</a:t>
+              <a:t>12/4/2024</a:t>
             </a:fld>
             <a:endParaRPr lang="en-US" dirty="0"/>
           </a:p>
@@ -5148,7 +5148,7 @@
                 <a:latin typeface="Arial" charset="0"/>
                 <a:ea typeface="ＭＳ Ｐゴシック" charset="0"/>
               </a:rPr>
-              <a:t>Attention Based Event Isolation and Root Cause Diagnosis Using Deep Learning With DAG Extraction and Root Rank Scoring</a:t>
+              <a:t>Bayesian Root Cause Diagnosis using a Variational Autoencoder with Graph Attention and Event Clustering</a:t>
             </a:r>
           </a:p>
         </p:txBody>
@@ -5206,14 +5206,14 @@
           <a:ln/>
           <a:extLst>
             <a:ext uri="{909E8E84-426E-40dd-AFC4-6F175D3DCCD1}">
-              <a14:hiddenFill xmlns:a14="http://schemas.microsoft.com/office/drawing/2010/main" xmlns="">
+              <a14:hiddenFill xmlns="" xmlns:a14="http://schemas.microsoft.com/office/drawing/2010/main">
                 <a:solidFill>
                   <a:srgbClr val="FFFFFF"/>
                 </a:solidFill>
               </a14:hiddenFill>
             </a:ext>
             <a:ext uri="{91240B29-F687-4f45-9708-019B960494DF}">
-              <a14:hiddenLine xmlns:a14="http://schemas.microsoft.com/office/drawing/2010/main" xmlns="" w="9525">
+              <a14:hiddenLine xmlns="" xmlns:a14="http://schemas.microsoft.com/office/drawing/2010/main" w="9525">
                 <a:solidFill>
                   <a:srgbClr val="000000"/>
                 </a:solidFill>
@@ -14345,7 +14345,7 @@
               <a:rPr lang="en-US" sz="1200" dirty="0">
                 <a:latin typeface="+mn-lt"/>
               </a:rPr>
-              <a:t>Utilizing an attention-based LSTM auto-encoder for multivariate anomaly detection with a focus on grouping anomalies into time windows, the objective is to identify clusters of anomalous events and perform root cause analysis (RCA) using attention-based Directed Acyclic Graph (DAG) extraction and root ranking techniques. The analysis will be conducted on the </a:t>
+              <a:t>Utilizing a Variational Auto-Encoder with Graph Attention Networks that incorporates Bayesian networks, the objective is to identify clusters of anomalous events and perform root cause analysis using a single framework. The methodology will be compared to a baseline model that extracts root causes using Granger Causality. The analysis will be conducted on the </a:t>
             </a:r>
             <a:r>
               <a:rPr lang="en-US" sz="1200" dirty="0" err="1">
@@ -15327,14 +15327,14 @@
             <p:ph idx="1"/>
             <p:extLst>
               <p:ext uri="{D42A27DB-BD31-4B8C-83A1-F6EECF244321}">
-                <p14:modId xmlns:p14="http://schemas.microsoft.com/office/powerpoint/2010/main" val="2434635861"/>
+                <p14:modId xmlns:p14="http://schemas.microsoft.com/office/powerpoint/2010/main" val="3794592025"/>
               </p:ext>
             </p:extLst>
           </p:nvPr>
         </p:nvGraphicFramePr>
         <p:xfrm>
           <a:off x="0" y="26958"/>
-          <a:ext cx="9144000" cy="5821703"/>
+          <a:ext cx="9144000" cy="5996472"/>
         </p:xfrm>
         <a:graphic>
           <a:graphicData uri="http://schemas.openxmlformats.org/drawingml/2006/table">
@@ -15466,7 +15466,7 @@
                           <a:ea typeface="+mn-ea"/>
                           <a:cs typeface="Arial" panose="020B0604020202020204" pitchFamily="34" charset="0"/>
                         </a:rPr>
-                        <a:t>A machine learning system utilizing anomaly detection, event grouping, and causal diagnosis will reduce mean-time to recovery by 75% through isolating the symptoms of the event. </a:t>
+                        <a:t>A deep Bayesian network optimized using a Variational Autoencoder with Graph Attention will increase root cause identification accuracy by 10% compared to existing machine learning-based RCA models such as MPGE, due to its ability to model complex dependencies, capture latent patterns, and leverage graph-structed data. </a:t>
                       </a:r>
                     </a:p>
                   </a:txBody>
@@ -15499,7 +15499,7 @@
                           <a:latin typeface="+mn-lt"/>
                           <a:cs typeface="Arial" panose="020B0604020202020204" pitchFamily="34" charset="0"/>
                         </a:rPr>
-                        <a:t>24</a:t>
+                        <a:t>45</a:t>
                       </a:r>
                     </a:p>
                   </a:txBody>

</xml_diff>